<commit_message>
modify spint1 presentation and add second sprint backlog
</commit_message>
<xml_diff>
--- a/Sprint1_Pres.pptx
+++ b/Sprint1_Pres.pptx
@@ -208,7 +208,7 @@
           <a:p>
             <a:fld id="{05344512-8A85-8441-A8DA-1957F626146D}" type="datetimeFigureOut">
               <a:rPr lang="en-US" smtClean="0"/>
-              <a:t>3/21/16</a:t>
+              <a:t>3/22/16</a:t>
             </a:fld>
             <a:endParaRPr lang="en-US"/>
           </a:p>
@@ -551,6 +551,929 @@
     <p:extLst>
       <p:ext uri="{BB962C8B-B14F-4D97-AF65-F5344CB8AC3E}">
         <p14:creationId xmlns:p14="http://schemas.microsoft.com/office/powerpoint/2010/main" val="66980860"/>
+      </p:ext>
+    </p:extLst>
+  </p:cSld>
+  <p:clrMapOvr>
+    <a:masterClrMapping/>
+  </p:clrMapOvr>
+</p:notes>
+</file>
+
+<file path=ppt/notesSlides/notesSlide10.xml><?xml version="1.0" encoding="utf-8"?>
+<p:notes xmlns:a="http://schemas.openxmlformats.org/drawingml/2006/main" xmlns:r="http://schemas.openxmlformats.org/officeDocument/2006/relationships" xmlns:p="http://schemas.openxmlformats.org/presentationml/2006/main">
+  <p:cSld>
+    <p:spTree>
+      <p:nvGrpSpPr>
+        <p:cNvPr id="1" name=""/>
+        <p:cNvGrpSpPr/>
+        <p:nvPr/>
+      </p:nvGrpSpPr>
+      <p:grpSpPr>
+        <a:xfrm>
+          <a:off x="0" y="0"/>
+          <a:ext cx="0" cy="0"/>
+          <a:chOff x="0" y="0"/>
+          <a:chExt cx="0" cy="0"/>
+        </a:xfrm>
+      </p:grpSpPr>
+      <p:sp>
+        <p:nvSpPr>
+          <p:cNvPr id="2" name="Slide Image Placeholder 1"/>
+          <p:cNvSpPr>
+            <a:spLocks noGrp="1" noRot="1" noChangeAspect="1"/>
+          </p:cNvSpPr>
+          <p:nvPr>
+            <p:ph type="sldImg"/>
+          </p:nvPr>
+        </p:nvSpPr>
+        <p:spPr/>
+      </p:sp>
+      <p:sp>
+        <p:nvSpPr>
+          <p:cNvPr id="3" name="Notes Placeholder 2"/>
+          <p:cNvSpPr>
+            <a:spLocks noGrp="1"/>
+          </p:cNvSpPr>
+          <p:nvPr>
+            <p:ph type="body" idx="1"/>
+          </p:nvPr>
+        </p:nvSpPr>
+        <p:spPr/>
+        <p:txBody>
+          <a:bodyPr/>
+          <a:lstStyle/>
+          <a:p>
+            <a:endParaRPr lang="en-US" dirty="0"/>
+          </a:p>
+        </p:txBody>
+      </p:sp>
+      <p:sp>
+        <p:nvSpPr>
+          <p:cNvPr id="4" name="Slide Number Placeholder 3"/>
+          <p:cNvSpPr>
+            <a:spLocks noGrp="1"/>
+          </p:cNvSpPr>
+          <p:nvPr>
+            <p:ph type="sldNum" sz="quarter" idx="10"/>
+          </p:nvPr>
+        </p:nvSpPr>
+        <p:spPr/>
+        <p:txBody>
+          <a:bodyPr/>
+          <a:lstStyle/>
+          <a:p>
+            <a:fld id="{51AB2A4D-FE8A-1944-A075-C823233CA327}" type="slidenum">
+              <a:rPr lang="en-US" smtClean="0"/>
+              <a:t>12</a:t>
+            </a:fld>
+            <a:endParaRPr lang="en-US"/>
+          </a:p>
+        </p:txBody>
+      </p:sp>
+    </p:spTree>
+    <p:extLst>
+      <p:ext uri="{BB962C8B-B14F-4D97-AF65-F5344CB8AC3E}">
+        <p14:creationId xmlns:p14="http://schemas.microsoft.com/office/powerpoint/2010/main" val="1736426985"/>
+      </p:ext>
+    </p:extLst>
+  </p:cSld>
+  <p:clrMapOvr>
+    <a:masterClrMapping/>
+  </p:clrMapOvr>
+</p:notes>
+</file>
+
+<file path=ppt/notesSlides/notesSlide2.xml><?xml version="1.0" encoding="utf-8"?>
+<p:notes xmlns:a="http://schemas.openxmlformats.org/drawingml/2006/main" xmlns:r="http://schemas.openxmlformats.org/officeDocument/2006/relationships" xmlns:p="http://schemas.openxmlformats.org/presentationml/2006/main">
+  <p:cSld>
+    <p:spTree>
+      <p:nvGrpSpPr>
+        <p:cNvPr id="1" name=""/>
+        <p:cNvGrpSpPr/>
+        <p:nvPr/>
+      </p:nvGrpSpPr>
+      <p:grpSpPr>
+        <a:xfrm>
+          <a:off x="0" y="0"/>
+          <a:ext cx="0" cy="0"/>
+          <a:chOff x="0" y="0"/>
+          <a:chExt cx="0" cy="0"/>
+        </a:xfrm>
+      </p:grpSpPr>
+      <p:sp>
+        <p:nvSpPr>
+          <p:cNvPr id="2" name="Slide Image Placeholder 1"/>
+          <p:cNvSpPr>
+            <a:spLocks noGrp="1" noRot="1" noChangeAspect="1"/>
+          </p:cNvSpPr>
+          <p:nvPr>
+            <p:ph type="sldImg"/>
+          </p:nvPr>
+        </p:nvSpPr>
+        <p:spPr/>
+      </p:sp>
+      <p:sp>
+        <p:nvSpPr>
+          <p:cNvPr id="3" name="Notes Placeholder 2"/>
+          <p:cNvSpPr>
+            <a:spLocks noGrp="1"/>
+          </p:cNvSpPr>
+          <p:nvPr>
+            <p:ph type="body" idx="1"/>
+          </p:nvPr>
+        </p:nvSpPr>
+        <p:spPr/>
+        <p:txBody>
+          <a:bodyPr/>
+          <a:lstStyle/>
+          <a:p>
+            <a:endParaRPr lang="en-US" dirty="0"/>
+          </a:p>
+        </p:txBody>
+      </p:sp>
+      <p:sp>
+        <p:nvSpPr>
+          <p:cNvPr id="4" name="Slide Number Placeholder 3"/>
+          <p:cNvSpPr>
+            <a:spLocks noGrp="1"/>
+          </p:cNvSpPr>
+          <p:nvPr>
+            <p:ph type="sldNum" sz="quarter" idx="10"/>
+          </p:nvPr>
+        </p:nvSpPr>
+        <p:spPr/>
+        <p:txBody>
+          <a:bodyPr/>
+          <a:lstStyle/>
+          <a:p>
+            <a:fld id="{51AB2A4D-FE8A-1944-A075-C823233CA327}" type="slidenum">
+              <a:rPr lang="en-US" smtClean="0"/>
+              <a:t>2</a:t>
+            </a:fld>
+            <a:endParaRPr lang="en-US"/>
+          </a:p>
+        </p:txBody>
+      </p:sp>
+    </p:spTree>
+    <p:extLst>
+      <p:ext uri="{BB962C8B-B14F-4D97-AF65-F5344CB8AC3E}">
+        <p14:creationId xmlns:p14="http://schemas.microsoft.com/office/powerpoint/2010/main" val="1535268269"/>
+      </p:ext>
+    </p:extLst>
+  </p:cSld>
+  <p:clrMapOvr>
+    <a:masterClrMapping/>
+  </p:clrMapOvr>
+</p:notes>
+</file>
+
+<file path=ppt/notesSlides/notesSlide3.xml><?xml version="1.0" encoding="utf-8"?>
+<p:notes xmlns:a="http://schemas.openxmlformats.org/drawingml/2006/main" xmlns:r="http://schemas.openxmlformats.org/officeDocument/2006/relationships" xmlns:p="http://schemas.openxmlformats.org/presentationml/2006/main">
+  <p:cSld>
+    <p:spTree>
+      <p:nvGrpSpPr>
+        <p:cNvPr id="1" name=""/>
+        <p:cNvGrpSpPr/>
+        <p:nvPr/>
+      </p:nvGrpSpPr>
+      <p:grpSpPr>
+        <a:xfrm>
+          <a:off x="0" y="0"/>
+          <a:ext cx="0" cy="0"/>
+          <a:chOff x="0" y="0"/>
+          <a:chExt cx="0" cy="0"/>
+        </a:xfrm>
+      </p:grpSpPr>
+      <p:sp>
+        <p:nvSpPr>
+          <p:cNvPr id="2" name="Slide Image Placeholder 1"/>
+          <p:cNvSpPr>
+            <a:spLocks noGrp="1" noRot="1" noChangeAspect="1"/>
+          </p:cNvSpPr>
+          <p:nvPr>
+            <p:ph type="sldImg"/>
+          </p:nvPr>
+        </p:nvSpPr>
+        <p:spPr/>
+      </p:sp>
+      <p:sp>
+        <p:nvSpPr>
+          <p:cNvPr id="3" name="Notes Placeholder 2"/>
+          <p:cNvSpPr>
+            <a:spLocks noGrp="1"/>
+          </p:cNvSpPr>
+          <p:nvPr>
+            <p:ph type="body" idx="1"/>
+          </p:nvPr>
+        </p:nvSpPr>
+        <p:spPr/>
+        <p:txBody>
+          <a:bodyPr/>
+          <a:lstStyle/>
+          <a:p>
+            <a:r>
+              <a:rPr lang="en-US" dirty="0" smtClean="0"/>
+              <a:t>In old</a:t>
+            </a:r>
+            <a:r>
+              <a:rPr lang="en-US" baseline="0" dirty="0" smtClean="0"/>
+              <a:t> days, p</a:t>
+            </a:r>
+            <a:r>
+              <a:rPr lang="en-US" dirty="0" smtClean="0"/>
+              <a:t>eople used to depend</a:t>
+            </a:r>
+            <a:r>
+              <a:rPr lang="en-US" baseline="0" dirty="0" smtClean="0"/>
+              <a:t> on the travel agency to take care everything for their travel. </a:t>
+            </a:r>
+            <a:endParaRPr lang="en-US" dirty="0" smtClean="0"/>
+          </a:p>
+          <a:p>
+            <a:r>
+              <a:rPr lang="en-US" dirty="0" smtClean="0"/>
+              <a:t>They</a:t>
+            </a:r>
+            <a:r>
+              <a:rPr lang="en-US" baseline="0" dirty="0" smtClean="0"/>
+              <a:t> can plan their schedules and find some useful information on the website.</a:t>
+            </a:r>
+            <a:endParaRPr lang="en-US" dirty="0"/>
+          </a:p>
+        </p:txBody>
+      </p:sp>
+      <p:sp>
+        <p:nvSpPr>
+          <p:cNvPr id="4" name="Slide Number Placeholder 3"/>
+          <p:cNvSpPr>
+            <a:spLocks noGrp="1"/>
+          </p:cNvSpPr>
+          <p:nvPr>
+            <p:ph type="sldNum" sz="quarter" idx="10"/>
+          </p:nvPr>
+        </p:nvSpPr>
+        <p:spPr/>
+        <p:txBody>
+          <a:bodyPr/>
+          <a:lstStyle/>
+          <a:p>
+            <a:fld id="{51AB2A4D-FE8A-1944-A075-C823233CA327}" type="slidenum">
+              <a:rPr lang="en-US" smtClean="0"/>
+              <a:t>3</a:t>
+            </a:fld>
+            <a:endParaRPr lang="en-US"/>
+          </a:p>
+        </p:txBody>
+      </p:sp>
+    </p:spTree>
+    <p:extLst>
+      <p:ext uri="{BB962C8B-B14F-4D97-AF65-F5344CB8AC3E}">
+        <p14:creationId xmlns:p14="http://schemas.microsoft.com/office/powerpoint/2010/main" val="1076712754"/>
+      </p:ext>
+    </p:extLst>
+  </p:cSld>
+  <p:clrMapOvr>
+    <a:masterClrMapping/>
+  </p:clrMapOvr>
+</p:notes>
+</file>
+
+<file path=ppt/notesSlides/notesSlide4.xml><?xml version="1.0" encoding="utf-8"?>
+<p:notes xmlns:a="http://schemas.openxmlformats.org/drawingml/2006/main" xmlns:r="http://schemas.openxmlformats.org/officeDocument/2006/relationships" xmlns:p="http://schemas.openxmlformats.org/presentationml/2006/main">
+  <p:cSld>
+    <p:spTree>
+      <p:nvGrpSpPr>
+        <p:cNvPr id="1" name=""/>
+        <p:cNvGrpSpPr/>
+        <p:nvPr/>
+      </p:nvGrpSpPr>
+      <p:grpSpPr>
+        <a:xfrm>
+          <a:off x="0" y="0"/>
+          <a:ext cx="0" cy="0"/>
+          <a:chOff x="0" y="0"/>
+          <a:chExt cx="0" cy="0"/>
+        </a:xfrm>
+      </p:grpSpPr>
+      <p:sp>
+        <p:nvSpPr>
+          <p:cNvPr id="2" name="Slide Image Placeholder 1"/>
+          <p:cNvSpPr>
+            <a:spLocks noGrp="1" noRot="1" noChangeAspect="1"/>
+          </p:cNvSpPr>
+          <p:nvPr>
+            <p:ph type="sldImg"/>
+          </p:nvPr>
+        </p:nvSpPr>
+        <p:spPr/>
+      </p:sp>
+      <p:sp>
+        <p:nvSpPr>
+          <p:cNvPr id="3" name="Notes Placeholder 2"/>
+          <p:cNvSpPr>
+            <a:spLocks noGrp="1"/>
+          </p:cNvSpPr>
+          <p:nvPr>
+            <p:ph type="body" idx="1"/>
+          </p:nvPr>
+        </p:nvSpPr>
+        <p:spPr/>
+        <p:txBody>
+          <a:bodyPr/>
+          <a:lstStyle/>
+          <a:p>
+            <a:r>
+              <a:rPr lang="en-US" dirty="0" smtClean="0"/>
+              <a:t>For the first sprint,</a:t>
+            </a:r>
+            <a:r>
+              <a:rPr lang="en-US" baseline="0" dirty="0" smtClean="0"/>
+              <a:t> we have mainly the following 3 goals</a:t>
+            </a:r>
+            <a:endParaRPr lang="en-US" dirty="0"/>
+          </a:p>
+        </p:txBody>
+      </p:sp>
+      <p:sp>
+        <p:nvSpPr>
+          <p:cNvPr id="4" name="Slide Number Placeholder 3"/>
+          <p:cNvSpPr>
+            <a:spLocks noGrp="1"/>
+          </p:cNvSpPr>
+          <p:nvPr>
+            <p:ph type="sldNum" sz="quarter" idx="10"/>
+          </p:nvPr>
+        </p:nvSpPr>
+        <p:spPr/>
+        <p:txBody>
+          <a:bodyPr/>
+          <a:lstStyle/>
+          <a:p>
+            <a:fld id="{51AB2A4D-FE8A-1944-A075-C823233CA327}" type="slidenum">
+              <a:rPr lang="en-US" smtClean="0"/>
+              <a:t>4</a:t>
+            </a:fld>
+            <a:endParaRPr lang="en-US"/>
+          </a:p>
+        </p:txBody>
+      </p:sp>
+    </p:spTree>
+    <p:extLst>
+      <p:ext uri="{BB962C8B-B14F-4D97-AF65-F5344CB8AC3E}">
+        <p14:creationId xmlns:p14="http://schemas.microsoft.com/office/powerpoint/2010/main" val="1539345108"/>
+      </p:ext>
+    </p:extLst>
+  </p:cSld>
+  <p:clrMapOvr>
+    <a:masterClrMapping/>
+  </p:clrMapOvr>
+</p:notes>
+</file>
+
+<file path=ppt/notesSlides/notesSlide5.xml><?xml version="1.0" encoding="utf-8"?>
+<p:notes xmlns:a="http://schemas.openxmlformats.org/drawingml/2006/main" xmlns:r="http://schemas.openxmlformats.org/officeDocument/2006/relationships" xmlns:p="http://schemas.openxmlformats.org/presentationml/2006/main">
+  <p:cSld>
+    <p:spTree>
+      <p:nvGrpSpPr>
+        <p:cNvPr id="1" name=""/>
+        <p:cNvGrpSpPr/>
+        <p:nvPr/>
+      </p:nvGrpSpPr>
+      <p:grpSpPr>
+        <a:xfrm>
+          <a:off x="0" y="0"/>
+          <a:ext cx="0" cy="0"/>
+          <a:chOff x="0" y="0"/>
+          <a:chExt cx="0" cy="0"/>
+        </a:xfrm>
+      </p:grpSpPr>
+      <p:sp>
+        <p:nvSpPr>
+          <p:cNvPr id="2" name="Slide Image Placeholder 1"/>
+          <p:cNvSpPr>
+            <a:spLocks noGrp="1" noRot="1" noChangeAspect="1"/>
+          </p:cNvSpPr>
+          <p:nvPr>
+            <p:ph type="sldImg"/>
+          </p:nvPr>
+        </p:nvSpPr>
+        <p:spPr/>
+      </p:sp>
+      <p:sp>
+        <p:nvSpPr>
+          <p:cNvPr id="3" name="Notes Placeholder 2"/>
+          <p:cNvSpPr>
+            <a:spLocks noGrp="1"/>
+          </p:cNvSpPr>
+          <p:nvPr>
+            <p:ph type="body" idx="1"/>
+          </p:nvPr>
+        </p:nvSpPr>
+        <p:spPr/>
+        <p:txBody>
+          <a:bodyPr/>
+          <a:lstStyle/>
+          <a:p>
+            <a:r>
+              <a:rPr lang="en-US" dirty="0" smtClean="0"/>
+              <a:t>By now,</a:t>
+            </a:r>
+            <a:r>
+              <a:rPr lang="en-US" baseline="0" dirty="0" smtClean="0"/>
+              <a:t> we have achieve all goals for the first sprint</a:t>
+            </a:r>
+          </a:p>
+          <a:p>
+            <a:r>
+              <a:rPr lang="en-US" baseline="0" dirty="0" smtClean="0"/>
+              <a:t>We integrate the google map </a:t>
+            </a:r>
+            <a:r>
+              <a:rPr lang="en-US" baseline="0" dirty="0" err="1" smtClean="0"/>
+              <a:t>Api</a:t>
+            </a:r>
+            <a:r>
+              <a:rPr lang="en-US" baseline="0" dirty="0" smtClean="0"/>
+              <a:t> on our own website</a:t>
+            </a:r>
+            <a:endParaRPr lang="en-US" dirty="0"/>
+          </a:p>
+        </p:txBody>
+      </p:sp>
+      <p:sp>
+        <p:nvSpPr>
+          <p:cNvPr id="4" name="Slide Number Placeholder 3"/>
+          <p:cNvSpPr>
+            <a:spLocks noGrp="1"/>
+          </p:cNvSpPr>
+          <p:nvPr>
+            <p:ph type="sldNum" sz="quarter" idx="10"/>
+          </p:nvPr>
+        </p:nvSpPr>
+        <p:spPr/>
+        <p:txBody>
+          <a:bodyPr/>
+          <a:lstStyle/>
+          <a:p>
+            <a:fld id="{51AB2A4D-FE8A-1944-A075-C823233CA327}" type="slidenum">
+              <a:rPr lang="en-US" smtClean="0"/>
+              <a:t>5</a:t>
+            </a:fld>
+            <a:endParaRPr lang="en-US"/>
+          </a:p>
+        </p:txBody>
+      </p:sp>
+    </p:spTree>
+    <p:extLst>
+      <p:ext uri="{BB962C8B-B14F-4D97-AF65-F5344CB8AC3E}">
+        <p14:creationId xmlns:p14="http://schemas.microsoft.com/office/powerpoint/2010/main" val="1915237758"/>
+      </p:ext>
+    </p:extLst>
+  </p:cSld>
+  <p:clrMapOvr>
+    <a:masterClrMapping/>
+  </p:clrMapOvr>
+</p:notes>
+</file>
+
+<file path=ppt/notesSlides/notesSlide6.xml><?xml version="1.0" encoding="utf-8"?>
+<p:notes xmlns:a="http://schemas.openxmlformats.org/drawingml/2006/main" xmlns:r="http://schemas.openxmlformats.org/officeDocument/2006/relationships" xmlns:p="http://schemas.openxmlformats.org/presentationml/2006/main">
+  <p:cSld>
+    <p:spTree>
+      <p:nvGrpSpPr>
+        <p:cNvPr id="1" name=""/>
+        <p:cNvGrpSpPr/>
+        <p:nvPr/>
+      </p:nvGrpSpPr>
+      <p:grpSpPr>
+        <a:xfrm>
+          <a:off x="0" y="0"/>
+          <a:ext cx="0" cy="0"/>
+          <a:chOff x="0" y="0"/>
+          <a:chExt cx="0" cy="0"/>
+        </a:xfrm>
+      </p:grpSpPr>
+      <p:sp>
+        <p:nvSpPr>
+          <p:cNvPr id="2" name="Slide Image Placeholder 1"/>
+          <p:cNvSpPr>
+            <a:spLocks noGrp="1" noRot="1" noChangeAspect="1"/>
+          </p:cNvSpPr>
+          <p:nvPr>
+            <p:ph type="sldImg"/>
+          </p:nvPr>
+        </p:nvSpPr>
+        <p:spPr/>
+      </p:sp>
+      <p:sp>
+        <p:nvSpPr>
+          <p:cNvPr id="3" name="Notes Placeholder 2"/>
+          <p:cNvSpPr>
+            <a:spLocks noGrp="1"/>
+          </p:cNvSpPr>
+          <p:nvPr>
+            <p:ph type="body" idx="1"/>
+          </p:nvPr>
+        </p:nvSpPr>
+        <p:spPr/>
+        <p:txBody>
+          <a:bodyPr/>
+          <a:lstStyle/>
+          <a:p>
+            <a:pPr marL="0" marR="0" lvl="1" indent="0" algn="l" defTabSz="914400" rtl="0" eaLnBrk="1" fontAlgn="auto" latinLnBrk="0" hangingPunct="1">
+              <a:lnSpc>
+                <a:spcPct val="100000"/>
+              </a:lnSpc>
+              <a:spcBef>
+                <a:spcPts val="0"/>
+              </a:spcBef>
+              <a:spcAft>
+                <a:spcPts val="0"/>
+              </a:spcAft>
+              <a:buClrTx/>
+              <a:buSzTx/>
+              <a:buFontTx/>
+              <a:buNone/>
+              <a:tabLst/>
+              <a:defRPr/>
+            </a:pPr>
+            <a:r>
+              <a:rPr lang="en-US" dirty="0" smtClean="0"/>
+              <a:t>Code is similar with what we did in the homework</a:t>
+            </a:r>
+          </a:p>
+          <a:p>
+            <a:endParaRPr lang="en-US" dirty="0" smtClean="0"/>
+          </a:p>
+          <a:p>
+            <a:r>
+              <a:rPr lang="en-US" dirty="0" smtClean="0"/>
+              <a:t>For anonymous</a:t>
+            </a:r>
+            <a:r>
+              <a:rPr lang="en-US" baseline="0" dirty="0" smtClean="0"/>
+              <a:t> users, the identity will show visitor and when they want to use some functionalities that only authentication users can use, they will be asked to login first.</a:t>
+            </a:r>
+          </a:p>
+          <a:p>
+            <a:endParaRPr lang="en-US" baseline="0" dirty="0" smtClean="0"/>
+          </a:p>
+          <a:p>
+            <a:r>
+              <a:rPr lang="en-US" baseline="0" dirty="0" smtClean="0"/>
+              <a:t>For authentication users, they can use any functionality the website offers.</a:t>
+            </a:r>
+            <a:endParaRPr lang="en-US" dirty="0"/>
+          </a:p>
+        </p:txBody>
+      </p:sp>
+      <p:sp>
+        <p:nvSpPr>
+          <p:cNvPr id="4" name="Slide Number Placeholder 3"/>
+          <p:cNvSpPr>
+            <a:spLocks noGrp="1"/>
+          </p:cNvSpPr>
+          <p:nvPr>
+            <p:ph type="sldNum" sz="quarter" idx="10"/>
+          </p:nvPr>
+        </p:nvSpPr>
+        <p:spPr/>
+        <p:txBody>
+          <a:bodyPr/>
+          <a:lstStyle/>
+          <a:p>
+            <a:fld id="{51AB2A4D-FE8A-1944-A075-C823233CA327}" type="slidenum">
+              <a:rPr lang="en-US" smtClean="0"/>
+              <a:t>7</a:t>
+            </a:fld>
+            <a:endParaRPr lang="en-US"/>
+          </a:p>
+        </p:txBody>
+      </p:sp>
+    </p:spTree>
+    <p:extLst>
+      <p:ext uri="{BB962C8B-B14F-4D97-AF65-F5344CB8AC3E}">
+        <p14:creationId xmlns:p14="http://schemas.microsoft.com/office/powerpoint/2010/main" val="725157734"/>
+      </p:ext>
+    </p:extLst>
+  </p:cSld>
+  <p:clrMapOvr>
+    <a:masterClrMapping/>
+  </p:clrMapOvr>
+</p:notes>
+</file>
+
+<file path=ppt/notesSlides/notesSlide7.xml><?xml version="1.0" encoding="utf-8"?>
+<p:notes xmlns:a="http://schemas.openxmlformats.org/drawingml/2006/main" xmlns:r="http://schemas.openxmlformats.org/officeDocument/2006/relationships" xmlns:p="http://schemas.openxmlformats.org/presentationml/2006/main">
+  <p:cSld>
+    <p:spTree>
+      <p:nvGrpSpPr>
+        <p:cNvPr id="1" name=""/>
+        <p:cNvGrpSpPr/>
+        <p:nvPr/>
+      </p:nvGrpSpPr>
+      <p:grpSpPr>
+        <a:xfrm>
+          <a:off x="0" y="0"/>
+          <a:ext cx="0" cy="0"/>
+          <a:chOff x="0" y="0"/>
+          <a:chExt cx="0" cy="0"/>
+        </a:xfrm>
+      </p:grpSpPr>
+      <p:sp>
+        <p:nvSpPr>
+          <p:cNvPr id="2" name="Slide Image Placeholder 1"/>
+          <p:cNvSpPr>
+            <a:spLocks noGrp="1" noRot="1" noChangeAspect="1"/>
+          </p:cNvSpPr>
+          <p:nvPr>
+            <p:ph type="sldImg"/>
+          </p:nvPr>
+        </p:nvSpPr>
+        <p:spPr/>
+      </p:sp>
+      <p:sp>
+        <p:nvSpPr>
+          <p:cNvPr id="3" name="Notes Placeholder 2"/>
+          <p:cNvSpPr>
+            <a:spLocks noGrp="1"/>
+          </p:cNvSpPr>
+          <p:nvPr>
+            <p:ph type="body" idx="1"/>
+          </p:nvPr>
+        </p:nvSpPr>
+        <p:spPr/>
+        <p:txBody>
+          <a:bodyPr/>
+          <a:lstStyle/>
+          <a:p>
+            <a:r>
+              <a:rPr lang="en-US" dirty="0" smtClean="0"/>
+              <a:t>This</a:t>
+            </a:r>
+            <a:r>
+              <a:rPr lang="en-US" baseline="0" dirty="0" smtClean="0"/>
+              <a:t> is our homepage, since we </a:t>
+            </a:r>
+            <a:r>
+              <a:rPr lang="en-US" baseline="0" dirty="0" err="1" smtClean="0"/>
+              <a:t>didn</a:t>
+            </a:r>
+            <a:r>
+              <a:rPr lang="fr-FR" baseline="0" dirty="0" smtClean="0"/>
+              <a:t>’</a:t>
+            </a:r>
+            <a:r>
+              <a:rPr lang="en-US" baseline="0" dirty="0" smtClean="0"/>
+              <a:t>t put a lot of effort on the frontend, it may look like a little bit ugly. But we plan to refine the frontend after we implemented all functionalities.</a:t>
+            </a:r>
+          </a:p>
+          <a:p>
+            <a:endParaRPr lang="en-US" baseline="0" dirty="0" smtClean="0"/>
+          </a:p>
+          <a:p>
+            <a:r>
+              <a:rPr lang="en-US" baseline="0" dirty="0" smtClean="0"/>
+              <a:t>All popular travel notes and travel plans will list on the homepage.</a:t>
+            </a:r>
+            <a:endParaRPr lang="en-US" dirty="0"/>
+          </a:p>
+        </p:txBody>
+      </p:sp>
+      <p:sp>
+        <p:nvSpPr>
+          <p:cNvPr id="4" name="Slide Number Placeholder 3"/>
+          <p:cNvSpPr>
+            <a:spLocks noGrp="1"/>
+          </p:cNvSpPr>
+          <p:nvPr>
+            <p:ph type="sldNum" sz="quarter" idx="10"/>
+          </p:nvPr>
+        </p:nvSpPr>
+        <p:spPr/>
+        <p:txBody>
+          <a:bodyPr/>
+          <a:lstStyle/>
+          <a:p>
+            <a:fld id="{51AB2A4D-FE8A-1944-A075-C823233CA327}" type="slidenum">
+              <a:rPr lang="en-US" smtClean="0"/>
+              <a:t>8</a:t>
+            </a:fld>
+            <a:endParaRPr lang="en-US"/>
+          </a:p>
+        </p:txBody>
+      </p:sp>
+    </p:spTree>
+    <p:extLst>
+      <p:ext uri="{BB962C8B-B14F-4D97-AF65-F5344CB8AC3E}">
+        <p14:creationId xmlns:p14="http://schemas.microsoft.com/office/powerpoint/2010/main" val="997223803"/>
+      </p:ext>
+    </p:extLst>
+  </p:cSld>
+  <p:clrMapOvr>
+    <a:masterClrMapping/>
+  </p:clrMapOvr>
+</p:notes>
+</file>
+
+<file path=ppt/notesSlides/notesSlide8.xml><?xml version="1.0" encoding="utf-8"?>
+<p:notes xmlns:a="http://schemas.openxmlformats.org/drawingml/2006/main" xmlns:r="http://schemas.openxmlformats.org/officeDocument/2006/relationships" xmlns:p="http://schemas.openxmlformats.org/presentationml/2006/main">
+  <p:cSld>
+    <p:spTree>
+      <p:nvGrpSpPr>
+        <p:cNvPr id="1" name=""/>
+        <p:cNvGrpSpPr/>
+        <p:nvPr/>
+      </p:nvGrpSpPr>
+      <p:grpSpPr>
+        <a:xfrm>
+          <a:off x="0" y="0"/>
+          <a:ext cx="0" cy="0"/>
+          <a:chOff x="0" y="0"/>
+          <a:chExt cx="0" cy="0"/>
+        </a:xfrm>
+      </p:grpSpPr>
+      <p:sp>
+        <p:nvSpPr>
+          <p:cNvPr id="2" name="Slide Image Placeholder 1"/>
+          <p:cNvSpPr>
+            <a:spLocks noGrp="1" noRot="1" noChangeAspect="1"/>
+          </p:cNvSpPr>
+          <p:nvPr>
+            <p:ph type="sldImg"/>
+          </p:nvPr>
+        </p:nvSpPr>
+        <p:spPr/>
+      </p:sp>
+      <p:sp>
+        <p:nvSpPr>
+          <p:cNvPr id="3" name="Notes Placeholder 2"/>
+          <p:cNvSpPr>
+            <a:spLocks noGrp="1"/>
+          </p:cNvSpPr>
+          <p:nvPr>
+            <p:ph type="body" idx="1"/>
+          </p:nvPr>
+        </p:nvSpPr>
+        <p:spPr/>
+        <p:txBody>
+          <a:bodyPr/>
+          <a:lstStyle/>
+          <a:p>
+            <a:r>
+              <a:rPr lang="en-US" dirty="0" smtClean="0"/>
+              <a:t>We are still</a:t>
+            </a:r>
+            <a:r>
+              <a:rPr lang="en-US" baseline="0" dirty="0" smtClean="0"/>
+              <a:t> thinking a good schema of our data table.</a:t>
+            </a:r>
+            <a:endParaRPr lang="en-US" dirty="0" smtClean="0"/>
+          </a:p>
+          <a:p>
+            <a:r>
+              <a:rPr lang="en-US" dirty="0" smtClean="0"/>
+              <a:t>By now,</a:t>
+            </a:r>
+            <a:r>
+              <a:rPr lang="en-US" baseline="0" dirty="0" smtClean="0"/>
+              <a:t> when we use yelp API to get data, every time when webpage refreshes, it will call some functions to get the real-time data. It is really slow.</a:t>
+            </a:r>
+            <a:endParaRPr lang="en-US" dirty="0" smtClean="0"/>
+          </a:p>
+          <a:p>
+            <a:r>
+              <a:rPr lang="en-US" dirty="0" smtClean="0"/>
+              <a:t>We are thinking</a:t>
+            </a:r>
+            <a:r>
+              <a:rPr lang="en-US" baseline="0" dirty="0" smtClean="0"/>
+              <a:t> about using some other ways to improve the performance. Such as s</a:t>
+            </a:r>
+            <a:r>
+              <a:rPr lang="en-US" dirty="0" smtClean="0"/>
+              <a:t>craping</a:t>
+            </a:r>
+            <a:r>
+              <a:rPr lang="en-US" baseline="0" dirty="0" smtClean="0"/>
+              <a:t> the data and store in the database upfront</a:t>
+            </a:r>
+            <a:endParaRPr lang="en-US" dirty="0"/>
+          </a:p>
+        </p:txBody>
+      </p:sp>
+      <p:sp>
+        <p:nvSpPr>
+          <p:cNvPr id="4" name="Slide Number Placeholder 3"/>
+          <p:cNvSpPr>
+            <a:spLocks noGrp="1"/>
+          </p:cNvSpPr>
+          <p:nvPr>
+            <p:ph type="sldNum" sz="quarter" idx="10"/>
+          </p:nvPr>
+        </p:nvSpPr>
+        <p:spPr/>
+        <p:txBody>
+          <a:bodyPr/>
+          <a:lstStyle/>
+          <a:p>
+            <a:fld id="{51AB2A4D-FE8A-1944-A075-C823233CA327}" type="slidenum">
+              <a:rPr lang="en-US" smtClean="0"/>
+              <a:t>10</a:t>
+            </a:fld>
+            <a:endParaRPr lang="en-US"/>
+          </a:p>
+        </p:txBody>
+      </p:sp>
+    </p:spTree>
+    <p:extLst>
+      <p:ext uri="{BB962C8B-B14F-4D97-AF65-F5344CB8AC3E}">
+        <p14:creationId xmlns:p14="http://schemas.microsoft.com/office/powerpoint/2010/main" val="961504842"/>
+      </p:ext>
+    </p:extLst>
+  </p:cSld>
+  <p:clrMapOvr>
+    <a:masterClrMapping/>
+  </p:clrMapOvr>
+</p:notes>
+</file>
+
+<file path=ppt/notesSlides/notesSlide9.xml><?xml version="1.0" encoding="utf-8"?>
+<p:notes xmlns:a="http://schemas.openxmlformats.org/drawingml/2006/main" xmlns:r="http://schemas.openxmlformats.org/officeDocument/2006/relationships" xmlns:p="http://schemas.openxmlformats.org/presentationml/2006/main">
+  <p:cSld>
+    <p:spTree>
+      <p:nvGrpSpPr>
+        <p:cNvPr id="1" name=""/>
+        <p:cNvGrpSpPr/>
+        <p:nvPr/>
+      </p:nvGrpSpPr>
+      <p:grpSpPr>
+        <a:xfrm>
+          <a:off x="0" y="0"/>
+          <a:ext cx="0" cy="0"/>
+          <a:chOff x="0" y="0"/>
+          <a:chExt cx="0" cy="0"/>
+        </a:xfrm>
+      </p:grpSpPr>
+      <p:sp>
+        <p:nvSpPr>
+          <p:cNvPr id="2" name="Slide Image Placeholder 1"/>
+          <p:cNvSpPr>
+            <a:spLocks noGrp="1" noRot="1" noChangeAspect="1"/>
+          </p:cNvSpPr>
+          <p:nvPr>
+            <p:ph type="sldImg"/>
+          </p:nvPr>
+        </p:nvSpPr>
+        <p:spPr/>
+      </p:sp>
+      <p:sp>
+        <p:nvSpPr>
+          <p:cNvPr id="3" name="Notes Placeholder 2"/>
+          <p:cNvSpPr>
+            <a:spLocks noGrp="1"/>
+          </p:cNvSpPr>
+          <p:nvPr>
+            <p:ph type="body" idx="1"/>
+          </p:nvPr>
+        </p:nvSpPr>
+        <p:spPr/>
+        <p:txBody>
+          <a:bodyPr/>
+          <a:lstStyle/>
+          <a:p>
+            <a:endParaRPr lang="en-US" dirty="0"/>
+          </a:p>
+        </p:txBody>
+      </p:sp>
+      <p:sp>
+        <p:nvSpPr>
+          <p:cNvPr id="4" name="Slide Number Placeholder 3"/>
+          <p:cNvSpPr>
+            <a:spLocks noGrp="1"/>
+          </p:cNvSpPr>
+          <p:nvPr>
+            <p:ph type="sldNum" sz="quarter" idx="10"/>
+          </p:nvPr>
+        </p:nvSpPr>
+        <p:spPr/>
+        <p:txBody>
+          <a:bodyPr/>
+          <a:lstStyle/>
+          <a:p>
+            <a:fld id="{51AB2A4D-FE8A-1944-A075-C823233CA327}" type="slidenum">
+              <a:rPr lang="en-US" smtClean="0"/>
+              <a:t>11</a:t>
+            </a:fld>
+            <a:endParaRPr lang="en-US"/>
+          </a:p>
+        </p:txBody>
+      </p:sp>
+    </p:spTree>
+    <p:extLst>
+      <p:ext uri="{BB962C8B-B14F-4D97-AF65-F5344CB8AC3E}">
+        <p14:creationId xmlns:p14="http://schemas.microsoft.com/office/powerpoint/2010/main" val="1591615351"/>
       </p:ext>
     </p:extLst>
   </p:cSld>
@@ -1061,7 +1984,7 @@
           <a:p>
             <a:fld id="{09A1F5B8-FE25-0840-8C18-FD3DE4C84748}" type="datetime1">
               <a:rPr lang="en-US" smtClean="0"/>
-              <a:t>3/21/16</a:t>
+              <a:t>3/22/16</a:t>
             </a:fld>
             <a:endParaRPr lang="en-US"/>
           </a:p>
@@ -1240,7 +2163,7 @@
           <a:p>
             <a:fld id="{7D80CD11-DC77-5343-9037-0A9F2ED4DC46}" type="datetime1">
               <a:rPr lang="en-US" smtClean="0"/>
-              <a:t>3/21/16</a:t>
+              <a:t>3/22/16</a:t>
             </a:fld>
             <a:endParaRPr lang="en-US"/>
           </a:p>
@@ -1420,7 +2343,7 @@
           <a:p>
             <a:fld id="{AF937C43-2AF7-CD4C-87E7-913D4367B643}" type="datetime1">
               <a:rPr lang="en-US" smtClean="0"/>
-              <a:t>3/21/16</a:t>
+              <a:t>3/22/16</a:t>
             </a:fld>
             <a:endParaRPr lang="en-US"/>
           </a:p>
@@ -1590,7 +2513,7 @@
           <a:p>
             <a:fld id="{70D8CAEC-CE9A-1340-ABC2-0D3841997983}" type="datetime1">
               <a:rPr lang="en-US" smtClean="0"/>
-              <a:t>3/21/16</a:t>
+              <a:t>3/22/16</a:t>
             </a:fld>
             <a:endParaRPr lang="en-US"/>
           </a:p>
@@ -1911,7 +2834,7 @@
           <a:p>
             <a:fld id="{B75A064E-C616-5F4E-800F-6707FD40FA72}" type="datetime1">
               <a:rPr lang="en-US" smtClean="0"/>
-              <a:t>3/21/16</a:t>
+              <a:t>3/22/16</a:t>
             </a:fld>
             <a:endParaRPr lang="en-US"/>
           </a:p>
@@ -2371,7 +3294,7 @@
           <a:p>
             <a:fld id="{12ABFA08-3D8A-8D45-86A5-84305A1DD46E}" type="datetime1">
               <a:rPr lang="en-US" smtClean="0"/>
-              <a:t>3/21/16</a:t>
+              <a:t>3/22/16</a:t>
             </a:fld>
             <a:endParaRPr lang="en-US"/>
           </a:p>
@@ -2787,7 +3710,7 @@
           <a:p>
             <a:fld id="{5C71DB74-D139-3443-8C4E-53B4F5DF9D23}" type="datetime1">
               <a:rPr lang="en-US" smtClean="0"/>
-              <a:t>3/21/16</a:t>
+              <a:t>3/22/16</a:t>
             </a:fld>
             <a:endParaRPr lang="en-US"/>
           </a:p>
@@ -2910,7 +3833,7 @@
           <a:p>
             <a:fld id="{82A04997-27E3-3A47-B91D-E8C5D4A82642}" type="datetime1">
               <a:rPr lang="en-US" smtClean="0"/>
-              <a:t>3/21/16</a:t>
+              <a:t>3/22/16</a:t>
             </a:fld>
             <a:endParaRPr lang="en-US"/>
           </a:p>
@@ -3028,7 +3951,7 @@
           <a:p>
             <a:fld id="{E4776495-588D-5642-8FDB-6C4B19493F8F}" type="datetime1">
               <a:rPr lang="en-US" smtClean="0"/>
-              <a:t>3/21/16</a:t>
+              <a:t>3/22/16</a:t>
             </a:fld>
             <a:endParaRPr lang="en-US"/>
           </a:p>
@@ -3386,7 +4309,7 @@
           <a:p>
             <a:fld id="{CC45E1D6-FDF0-3544-94B6-A7405DB342A8}" type="datetime1">
               <a:rPr lang="en-US" smtClean="0"/>
-              <a:t>3/21/16</a:t>
+              <a:t>3/22/16</a:t>
             </a:fld>
             <a:endParaRPr lang="en-US"/>
           </a:p>
@@ -3898,7 +4821,7 @@
           <a:p>
             <a:fld id="{E298EF50-71EC-D144-87CB-29444E012090}" type="datetime1">
               <a:rPr lang="en-US" smtClean="0"/>
-              <a:t>3/21/16</a:t>
+              <a:t>3/22/16</a:t>
             </a:fld>
             <a:endParaRPr lang="en-US"/>
           </a:p>
@@ -4253,7 +5176,7 @@
           <a:p>
             <a:fld id="{A4E4D915-459B-1B4B-9A57-2AD5D7E3FDE8}" type="datetime1">
               <a:rPr lang="en-US" smtClean="0"/>
-              <a:t>3/21/16</a:t>
+              <a:t>3/22/16</a:t>
             </a:fld>
             <a:endParaRPr lang="en-US"/>
           </a:p>
@@ -5195,32 +6118,41 @@
           <a:p>
             <a:r>
               <a:rPr lang="en-US" sz="2400" dirty="0" smtClean="0"/>
-              <a:t>How to construct the database?</a:t>
-            </a:r>
+              <a:t>Fix problems</a:t>
+            </a:r>
+          </a:p>
+          <a:p>
+            <a:r>
+              <a:rPr lang="en-US" sz="2400" dirty="0" smtClean="0"/>
+              <a:t>Finish all functionalities</a:t>
+            </a:r>
+            <a:endParaRPr lang="en-US" sz="2400" dirty="0" smtClean="0"/>
           </a:p>
           <a:p>
             <a:pPr lvl="1"/>
             <a:r>
-              <a:rPr lang="en-US" sz="2000" dirty="0" smtClean="0"/>
-              <a:t>Each note or plan has multiple time &amp; place pairs. But the number is uncertain.</a:t>
-            </a:r>
-            <a:endParaRPr lang="en-US" sz="2400" dirty="0" smtClean="0"/>
-          </a:p>
-          <a:p>
-            <a:endParaRPr lang="en-US" sz="2400" dirty="0" smtClean="0"/>
-          </a:p>
-          <a:p>
-            <a:r>
-              <a:rPr lang="en-US" sz="2400" dirty="0" smtClean="0"/>
-              <a:t>Scrape the data and store in the database?</a:t>
+              <a:rPr lang="en-US" dirty="0" smtClean="0"/>
+              <a:t>Add new plan &amp; new note</a:t>
             </a:r>
           </a:p>
           <a:p>
             <a:pPr lvl="1"/>
             <a:r>
-              <a:rPr lang="en-US" sz="2200" dirty="0" smtClean="0"/>
-              <a:t>Get yelp’s data when calling the function. The latency is high.</a:t>
-            </a:r>
+              <a:rPr lang="en-US" dirty="0" smtClean="0"/>
+              <a:t>Operations on plan &amp; note</a:t>
+            </a:r>
+            <a:endParaRPr lang="en-US" dirty="0" smtClean="0"/>
+          </a:p>
+          <a:p>
+            <a:pPr lvl="1"/>
+            <a:r>
+              <a:rPr lang="en-US" dirty="0" smtClean="0"/>
+              <a:t>Search companions </a:t>
+            </a:r>
+          </a:p>
+          <a:p>
+            <a:pPr lvl="1"/>
+            <a:endParaRPr lang="en-US" dirty="0" smtClean="0"/>
           </a:p>
           <a:p>
             <a:pPr lvl="1"/>
@@ -5422,8 +6354,9 @@
           <a:p>
             <a:r>
               <a:rPr lang="en-US" sz="3600" dirty="0" smtClean="0"/>
-              <a:t>Introduction</a:t>
-            </a:r>
+              <a:t>Background &amp; Introduction</a:t>
+            </a:r>
+            <a:endParaRPr lang="en-US" sz="3600" dirty="0" smtClean="0"/>
           </a:p>
           <a:p>
             <a:r>
@@ -5537,7 +6470,7 @@
           <a:p>
             <a:r>
               <a:rPr lang="en-US" dirty="0" smtClean="0"/>
-              <a:t>Introduction</a:t>
+              <a:t>Background &amp; Introduction</a:t>
             </a:r>
             <a:endParaRPr lang="en-US" dirty="0"/>
           </a:p>
@@ -5553,14 +6486,29 @@
             <p:ph idx="1"/>
           </p:nvPr>
         </p:nvSpPr>
-        <p:spPr/>
+        <p:spPr>
+          <a:xfrm>
+            <a:off x="1069848" y="1737360"/>
+            <a:ext cx="10058400" cy="4434840"/>
+          </a:xfrm>
+        </p:spPr>
         <p:txBody>
           <a:bodyPr/>
           <a:lstStyle/>
           <a:p>
             <a:r>
               <a:rPr lang="en-US" dirty="0" smtClean="0"/>
-              <a:t>A Travel Website “Go Travel”</a:t>
+              <a:t>People travel a lot and enjoy planning the trip by themselves</a:t>
+            </a:r>
+          </a:p>
+          <a:p>
+            <a:r>
+              <a:rPr lang="en-US" dirty="0" smtClean="0"/>
+              <a:t>A </a:t>
+            </a:r>
+            <a:r>
+              <a:rPr lang="en-US" dirty="0" smtClean="0"/>
+              <a:t>Travel Website </a:t>
             </a:r>
           </a:p>
           <a:p>
@@ -5600,7 +6548,6 @@
               <a:rPr lang="en-US" dirty="0" smtClean="0"/>
               <a:t>Search by your own plan or key words </a:t>
             </a:r>
-            <a:endParaRPr lang="en-US" dirty="0" smtClean="0"/>
           </a:p>
           <a:p>
             <a:pPr lvl="1"/>
@@ -5630,7 +6577,6 @@
               <a:rPr lang="en-US" sz="2000" dirty="0" smtClean="0"/>
               <a:t>Provide recommendations about the hotels and restaurants about the travel place</a:t>
             </a:r>
-            <a:endParaRPr lang="en-US" sz="2000" dirty="0" smtClean="0"/>
           </a:p>
         </p:txBody>
       </p:sp>
@@ -5763,14 +6709,38 @@
             <a:pPr lvl="1"/>
             <a:r>
               <a:rPr lang="en-US" dirty="0" smtClean="0"/>
-              <a:t>Homepage, Travel Notes, Travel Plans can be accessed with anonymous users</a:t>
+              <a:t>Some functionalities can </a:t>
+            </a:r>
+            <a:r>
+              <a:rPr lang="en-US" dirty="0" smtClean="0"/>
+              <a:t>be </a:t>
+            </a:r>
+            <a:r>
+              <a:rPr lang="en-US" dirty="0" smtClean="0"/>
+              <a:t>used by anonymous </a:t>
+            </a:r>
+            <a:r>
+              <a:rPr lang="en-US" dirty="0" smtClean="0"/>
+              <a:t>users</a:t>
             </a:r>
           </a:p>
           <a:p>
             <a:pPr lvl="1"/>
             <a:r>
               <a:rPr lang="en-US" dirty="0" smtClean="0"/>
-              <a:t>Other functionalities only can be accessed with authentication users</a:t>
+              <a:t>Complete </a:t>
+            </a:r>
+            <a:r>
+              <a:rPr lang="en-US" dirty="0" smtClean="0"/>
+              <a:t>functionalities only can be </a:t>
+            </a:r>
+            <a:r>
+              <a:rPr lang="en-US" dirty="0" smtClean="0"/>
+              <a:t>used by authentication </a:t>
+            </a:r>
+            <a:r>
+              <a:rPr lang="en-US" dirty="0" smtClean="0"/>
+              <a:t>users</a:t>
             </a:r>
           </a:p>
           <a:p>
@@ -5956,7 +6926,7 @@
           <p:nvPr/>
         </p:nvPicPr>
         <p:blipFill>
-          <a:blip r:embed="rId2">
+          <a:blip r:embed="rId3">
             <a:extLst>
               <a:ext uri="{28A0092B-C50C-407E-A947-70E740481C1C}">
                 <a14:useLocalDpi xmlns:a14="http://schemas.microsoft.com/office/drawing/2010/main" val="0"/>
@@ -6233,16 +7203,20 @@
             <a:pPr lvl="1"/>
             <a:r>
               <a:rPr lang="en-US" dirty="0" smtClean="0"/>
-              <a:t>Code is just like what we did in the homework</a:t>
-            </a:r>
-            <a:endParaRPr lang="en-US" dirty="0"/>
+              <a:t>Anonymous User</a:t>
+            </a:r>
+          </a:p>
+          <a:p>
+            <a:pPr lvl="2"/>
+            <a:r>
+              <a:rPr lang="en-US" dirty="0"/>
+              <a:t>Homepage, Travel Notes, Travel Plans</a:t>
+            </a:r>
+            <a:endParaRPr lang="en-US" dirty="0" smtClean="0"/>
           </a:p>
           <a:p>
             <a:pPr lvl="1"/>
-            <a:r>
-              <a:rPr lang="en-US" dirty="0" smtClean="0"/>
-              <a:t>Anonymous User</a:t>
-            </a:r>
+            <a:endParaRPr lang="en-US" dirty="0" smtClean="0"/>
           </a:p>
           <a:p>
             <a:pPr lvl="1"/>
@@ -6254,13 +7228,13 @@
           </a:p>
           <a:p>
             <a:pPr lvl="1"/>
-            <a:endParaRPr lang="en-US" dirty="0"/>
-          </a:p>
-          <a:p>
-            <a:pPr lvl="1"/>
             <a:r>
               <a:rPr lang="en-US" dirty="0" smtClean="0"/>
-              <a:t>Authenticate User</a:t>
+              <a:t>Authentication </a:t>
+            </a:r>
+            <a:r>
+              <a:rPr lang="en-US" dirty="0" smtClean="0"/>
+              <a:t>User</a:t>
             </a:r>
           </a:p>
           <a:p>
@@ -6299,36 +7273,6 @@
       <p:pic>
         <p:nvPicPr>
           <p:cNvPr id="5" name="Picture 4"/>
-          <p:cNvPicPr>
-            <a:picLocks noChangeAspect="1"/>
-          </p:cNvPicPr>
-          <p:nvPr/>
-        </p:nvPicPr>
-        <p:blipFill>
-          <a:blip r:embed="rId2">
-            <a:extLst>
-              <a:ext uri="{28A0092B-C50C-407E-A947-70E740481C1C}">
-                <a14:useLocalDpi xmlns:a14="http://schemas.microsoft.com/office/drawing/2010/main" val="0"/>
-              </a:ext>
-            </a:extLst>
-          </a:blip>
-          <a:stretch>
-            <a:fillRect/>
-          </a:stretch>
-        </p:blipFill>
-        <p:spPr>
-          <a:xfrm>
-            <a:off x="1628503" y="3241403"/>
-            <a:ext cx="2730500" cy="571500"/>
-          </a:xfrm>
-          <a:prstGeom prst="rect">
-            <a:avLst/>
-          </a:prstGeom>
-        </p:spPr>
-      </p:pic>
-      <p:pic>
-        <p:nvPicPr>
-          <p:cNvPr id="7" name="Picture 6"/>
           <p:cNvPicPr>
             <a:picLocks noChangeAspect="1"/>
           </p:cNvPicPr>
@@ -6348,7 +7292,37 @@
         </p:blipFill>
         <p:spPr>
           <a:xfrm>
-            <a:off x="1628503" y="4744901"/>
+            <a:off x="1888672" y="3278958"/>
+            <a:ext cx="2730500" cy="571500"/>
+          </a:xfrm>
+          <a:prstGeom prst="rect">
+            <a:avLst/>
+          </a:prstGeom>
+        </p:spPr>
+      </p:pic>
+      <p:pic>
+        <p:nvPicPr>
+          <p:cNvPr id="7" name="Picture 6"/>
+          <p:cNvPicPr>
+            <a:picLocks noChangeAspect="1"/>
+          </p:cNvPicPr>
+          <p:nvPr/>
+        </p:nvPicPr>
+        <p:blipFill>
+          <a:blip r:embed="rId4">
+            <a:extLst>
+              <a:ext uri="{28A0092B-C50C-407E-A947-70E740481C1C}">
+                <a14:useLocalDpi xmlns:a14="http://schemas.microsoft.com/office/drawing/2010/main" val="0"/>
+              </a:ext>
+            </a:extLst>
+          </a:blip>
+          <a:stretch>
+            <a:fillRect/>
+          </a:stretch>
+        </p:blipFill>
+        <p:spPr>
+          <a:xfrm>
+            <a:off x="1888672" y="4760358"/>
             <a:ext cx="2806700" cy="495300"/>
           </a:xfrm>
           <a:prstGeom prst="rect">
@@ -6488,7 +7462,7 @@
           <p:nvPr/>
         </p:nvPicPr>
         <p:blipFill>
-          <a:blip r:embed="rId2">
+          <a:blip r:embed="rId3">
             <a:extLst>
               <a:ext uri="{28A0092B-C50C-407E-A947-70E740481C1C}">
                 <a14:useLocalDpi xmlns:a14="http://schemas.microsoft.com/office/drawing/2010/main" val="0"/>
@@ -6518,7 +7492,7 @@
           <p:nvPr/>
         </p:nvPicPr>
         <p:blipFill>
-          <a:blip r:embed="rId3">
+          <a:blip r:embed="rId4">
             <a:extLst>
               <a:ext uri="{28A0092B-C50C-407E-A947-70E740481C1C}">
                 <a14:useLocalDpi xmlns:a14="http://schemas.microsoft.com/office/drawing/2010/main" val="0"/>
@@ -6548,7 +7522,7 @@
           <p:nvPr/>
         </p:nvPicPr>
         <p:blipFill>
-          <a:blip r:embed="rId4">
+          <a:blip r:embed="rId5">
             <a:extLst>
               <a:ext uri="{28A0092B-C50C-407E-A947-70E740481C1C}">
                 <a14:useLocalDpi xmlns:a14="http://schemas.microsoft.com/office/drawing/2010/main" val="0"/>
@@ -6578,7 +7552,7 @@
           <p:nvPr/>
         </p:nvPicPr>
         <p:blipFill>
-          <a:blip r:embed="rId5">
+          <a:blip r:embed="rId6">
             <a:extLst>
               <a:ext uri="{28A0092B-C50C-407E-A947-70E740481C1C}">
                 <a14:useLocalDpi xmlns:a14="http://schemas.microsoft.com/office/drawing/2010/main" val="0"/>
@@ -6980,9 +7954,24 @@
           <a:p>
             <a:r>
               <a:rPr lang="en-US" sz="2400" dirty="0" smtClean="0"/>
-              <a:t>Scrum is useful </a:t>
-            </a:r>
-            <a:endParaRPr lang="en-US" sz="2400" dirty="0"/>
+              <a:t>Process(Scrum) </a:t>
+            </a:r>
+            <a:r>
+              <a:rPr lang="en-US" sz="2400" dirty="0" smtClean="0"/>
+              <a:t>is </a:t>
+            </a:r>
+            <a:r>
+              <a:rPr lang="en-US" sz="2400" dirty="0" smtClean="0"/>
+              <a:t>useful</a:t>
+            </a:r>
+          </a:p>
+          <a:p>
+            <a:pPr lvl="1"/>
+            <a:r>
+              <a:rPr lang="en-US" sz="2200" dirty="0" smtClean="0"/>
+              <a:t>Determine specific goals of the sprint </a:t>
+            </a:r>
+            <a:endParaRPr lang="en-US" sz="2200" dirty="0"/>
           </a:p>
         </p:txBody>
       </p:sp>

</xml_diff>